<commit_message>
changes to descriptions document
</commit_message>
<xml_diff>
--- a/docs/top_level_description.pptx
+++ b/docs/top_level_description.pptx
@@ -5,12 +5,14 @@
     <p:sldMasterId id="2147483660" r:id="rId1"/>
   </p:sldMasterIdLst>
   <p:notesMasterIdLst>
-    <p:notesMasterId r:id="rId5"/>
+    <p:notesMasterId r:id="rId7"/>
   </p:notesMasterIdLst>
   <p:sldIdLst>
     <p:sldId id="256" r:id="rId2"/>
     <p:sldId id="257" r:id="rId3"/>
     <p:sldId id="258" r:id="rId4"/>
+    <p:sldId id="259" r:id="rId5"/>
+    <p:sldId id="260" r:id="rId6"/>
   </p:sldIdLst>
   <p:sldSz cx="35999738" cy="35999738"/>
   <p:notesSz cx="6858000" cy="9144000"/>
@@ -109,6 +111,11 @@
       </a:defRPr>
     </a:lvl9pPr>
   </p:defaultTextStyle>
+  <p:extLst>
+    <p:ext uri="{EFAFB233-063F-42B5-8137-9DF3F51BA10A}">
+      <p15:sldGuideLst xmlns:p15="http://schemas.microsoft.com/office/powerpoint/2012/main"/>
+    </p:ext>
+  </p:extLst>
 </p:presentation>
 </file>
 
@@ -194,7 +201,7 @@
           <a:p>
             <a:fld id="{99907887-4DD5-4BD4-B0F8-5845CAD370CF}" type="datetimeFigureOut">
               <a:rPr lang="en-IE" smtClean="0"/>
-              <a:t>12/03/2024</a:t>
+              <a:t>30/03/2024</a:t>
             </a:fld>
             <a:endParaRPr lang="en-IE"/>
           </a:p>
@@ -761,7 +768,7 @@
           <a:p>
             <a:fld id="{D62B9E6E-E1CF-4126-B410-6CA9954278F2}" type="datetimeFigureOut">
               <a:rPr lang="en-IE" smtClean="0"/>
-              <a:t>12/03/2024</a:t>
+              <a:t>30/03/2024</a:t>
             </a:fld>
             <a:endParaRPr lang="en-IE"/>
           </a:p>
@@ -931,7 +938,7 @@
           <a:p>
             <a:fld id="{D62B9E6E-E1CF-4126-B410-6CA9954278F2}" type="datetimeFigureOut">
               <a:rPr lang="en-IE" smtClean="0"/>
-              <a:t>12/03/2024</a:t>
+              <a:t>30/03/2024</a:t>
             </a:fld>
             <a:endParaRPr lang="en-IE"/>
           </a:p>
@@ -1111,7 +1118,7 @@
           <a:p>
             <a:fld id="{D62B9E6E-E1CF-4126-B410-6CA9954278F2}" type="datetimeFigureOut">
               <a:rPr lang="en-IE" smtClean="0"/>
-              <a:t>12/03/2024</a:t>
+              <a:t>30/03/2024</a:t>
             </a:fld>
             <a:endParaRPr lang="en-IE"/>
           </a:p>
@@ -1281,7 +1288,7 @@
           <a:p>
             <a:fld id="{D62B9E6E-E1CF-4126-B410-6CA9954278F2}" type="datetimeFigureOut">
               <a:rPr lang="en-IE" smtClean="0"/>
-              <a:t>12/03/2024</a:t>
+              <a:t>30/03/2024</a:t>
             </a:fld>
             <a:endParaRPr lang="en-IE"/>
           </a:p>
@@ -1527,7 +1534,7 @@
           <a:p>
             <a:fld id="{D62B9E6E-E1CF-4126-B410-6CA9954278F2}" type="datetimeFigureOut">
               <a:rPr lang="en-IE" smtClean="0"/>
-              <a:t>12/03/2024</a:t>
+              <a:t>30/03/2024</a:t>
             </a:fld>
             <a:endParaRPr lang="en-IE"/>
           </a:p>
@@ -1759,7 +1766,7 @@
           <a:p>
             <a:fld id="{D62B9E6E-E1CF-4126-B410-6CA9954278F2}" type="datetimeFigureOut">
               <a:rPr lang="en-IE" smtClean="0"/>
-              <a:t>12/03/2024</a:t>
+              <a:t>30/03/2024</a:t>
             </a:fld>
             <a:endParaRPr lang="en-IE"/>
           </a:p>
@@ -2126,7 +2133,7 @@
           <a:p>
             <a:fld id="{D62B9E6E-E1CF-4126-B410-6CA9954278F2}" type="datetimeFigureOut">
               <a:rPr lang="en-IE" smtClean="0"/>
-              <a:t>12/03/2024</a:t>
+              <a:t>30/03/2024</a:t>
             </a:fld>
             <a:endParaRPr lang="en-IE"/>
           </a:p>
@@ -2244,7 +2251,7 @@
           <a:p>
             <a:fld id="{D62B9E6E-E1CF-4126-B410-6CA9954278F2}" type="datetimeFigureOut">
               <a:rPr lang="en-IE" smtClean="0"/>
-              <a:t>12/03/2024</a:t>
+              <a:t>30/03/2024</a:t>
             </a:fld>
             <a:endParaRPr lang="en-IE"/>
           </a:p>
@@ -2339,7 +2346,7 @@
           <a:p>
             <a:fld id="{D62B9E6E-E1CF-4126-B410-6CA9954278F2}" type="datetimeFigureOut">
               <a:rPr lang="en-IE" smtClean="0"/>
-              <a:t>12/03/2024</a:t>
+              <a:t>30/03/2024</a:t>
             </a:fld>
             <a:endParaRPr lang="en-IE"/>
           </a:p>
@@ -2616,7 +2623,7 @@
           <a:p>
             <a:fld id="{D62B9E6E-E1CF-4126-B410-6CA9954278F2}" type="datetimeFigureOut">
               <a:rPr lang="en-IE" smtClean="0"/>
-              <a:t>12/03/2024</a:t>
+              <a:t>30/03/2024</a:t>
             </a:fld>
             <a:endParaRPr lang="en-IE"/>
           </a:p>
@@ -2873,7 +2880,7 @@
           <a:p>
             <a:fld id="{D62B9E6E-E1CF-4126-B410-6CA9954278F2}" type="datetimeFigureOut">
               <a:rPr lang="en-IE" smtClean="0"/>
-              <a:t>12/03/2024</a:t>
+              <a:t>30/03/2024</a:t>
             </a:fld>
             <a:endParaRPr lang="en-IE"/>
           </a:p>
@@ -3086,7 +3093,7 @@
           <a:p>
             <a:fld id="{D62B9E6E-E1CF-4126-B410-6CA9954278F2}" type="datetimeFigureOut">
               <a:rPr lang="en-IE" smtClean="0"/>
-              <a:t>12/03/2024</a:t>
+              <a:t>30/03/2024</a:t>
             </a:fld>
             <a:endParaRPr lang="en-IE"/>
           </a:p>
@@ -10514,6 +10521,1128 @@
     <p:extLst>
       <p:ext uri="{BB962C8B-B14F-4D97-AF65-F5344CB8AC3E}">
         <p14:creationId xmlns:p14="http://schemas.microsoft.com/office/powerpoint/2010/main" val="839457328"/>
+      </p:ext>
+    </p:extLst>
+  </p:cSld>
+  <p:clrMapOvr>
+    <a:masterClrMapping/>
+  </p:clrMapOvr>
+</p:sld>
+</file>
+
+<file path=ppt/slides/slide4.xml><?xml version="1.0" encoding="utf-8"?>
+<p:sld xmlns:a="http://schemas.openxmlformats.org/drawingml/2006/main" xmlns:r="http://schemas.openxmlformats.org/officeDocument/2006/relationships" xmlns:p="http://schemas.openxmlformats.org/presentationml/2006/main">
+  <p:cSld>
+    <p:spTree>
+      <p:nvGrpSpPr>
+        <p:cNvPr id="1" name=""/>
+        <p:cNvGrpSpPr/>
+        <p:nvPr/>
+      </p:nvGrpSpPr>
+      <p:grpSpPr>
+        <a:xfrm>
+          <a:off x="0" y="0"/>
+          <a:ext cx="0" cy="0"/>
+          <a:chOff x="0" y="0"/>
+          <a:chExt cx="0" cy="0"/>
+        </a:xfrm>
+      </p:grpSpPr>
+      <p:sp>
+        <p:nvSpPr>
+          <p:cNvPr id="48" name="Rectangle: Rounded Corners 47">
+            <a:extLst>
+              <a:ext uri="{FF2B5EF4-FFF2-40B4-BE49-F238E27FC236}">
+                <a16:creationId xmlns:a16="http://schemas.microsoft.com/office/drawing/2014/main" id="{DE6B147A-B6ED-2CF7-880E-39A48567BBAB}"/>
+              </a:ext>
+            </a:extLst>
+          </p:cNvPr>
+          <p:cNvSpPr/>
+          <p:nvPr/>
+        </p:nvSpPr>
+        <p:spPr>
+          <a:xfrm>
+            <a:off x="11002632" y="22832314"/>
+            <a:ext cx="2151393" cy="501554"/>
+          </a:xfrm>
+          <a:prstGeom prst="roundRect">
+            <a:avLst>
+              <a:gd name="adj" fmla="val 3503"/>
+            </a:avLst>
+          </a:prstGeom>
+        </p:spPr>
+        <p:style>
+          <a:lnRef idx="2">
+            <a:schemeClr val="accent2">
+              <a:shade val="15000"/>
+            </a:schemeClr>
+          </a:lnRef>
+          <a:fillRef idx="1">
+            <a:schemeClr val="accent2"/>
+          </a:fillRef>
+          <a:effectRef idx="0">
+            <a:schemeClr val="accent2"/>
+          </a:effectRef>
+          <a:fontRef idx="minor">
+            <a:schemeClr val="lt1"/>
+          </a:fontRef>
+        </p:style>
+        <p:txBody>
+          <a:bodyPr rtlCol="0" anchor="t"/>
+          <a:lstStyle/>
+          <a:p>
+            <a:r>
+              <a:rPr lang="en-IE" sz="1200" dirty="0"/>
+              <a:t>Step 1: Parse </a:t>
+            </a:r>
+            <a:r>
+              <a:rPr lang="en-IE" sz="1200" dirty="0" err="1"/>
+              <a:t>HDLGen</a:t>
+            </a:r>
+            <a:r>
+              <a:rPr lang="en-IE" sz="1200" dirty="0"/>
+              <a:t> XML</a:t>
+            </a:r>
+          </a:p>
+        </p:txBody>
+      </p:sp>
+      <p:sp>
+        <p:nvSpPr>
+          <p:cNvPr id="49" name="Rectangle: Rounded Corners 48">
+            <a:extLst>
+              <a:ext uri="{FF2B5EF4-FFF2-40B4-BE49-F238E27FC236}">
+                <a16:creationId xmlns:a16="http://schemas.microsoft.com/office/drawing/2014/main" id="{52F6834C-BC9C-6707-8456-1EF1BC70E1AB}"/>
+              </a:ext>
+            </a:extLst>
+          </p:cNvPr>
+          <p:cNvSpPr/>
+          <p:nvPr/>
+        </p:nvSpPr>
+        <p:spPr>
+          <a:xfrm>
+            <a:off x="11002631" y="23333867"/>
+            <a:ext cx="2151393" cy="2297907"/>
+          </a:xfrm>
+          <a:prstGeom prst="roundRect">
+            <a:avLst>
+              <a:gd name="adj" fmla="val 3503"/>
+            </a:avLst>
+          </a:prstGeom>
+        </p:spPr>
+        <p:style>
+          <a:lnRef idx="2">
+            <a:schemeClr val="accent2">
+              <a:shade val="15000"/>
+            </a:schemeClr>
+          </a:lnRef>
+          <a:fillRef idx="1">
+            <a:schemeClr val="accent2"/>
+          </a:fillRef>
+          <a:effectRef idx="0">
+            <a:schemeClr val="accent2"/>
+          </a:effectRef>
+          <a:fontRef idx="minor">
+            <a:schemeClr val="lt1"/>
+          </a:fontRef>
+        </p:style>
+        <p:txBody>
+          <a:bodyPr rtlCol="0" anchor="t"/>
+          <a:lstStyle/>
+          <a:p>
+            <a:pPr marL="228600" indent="-228600">
+              <a:buAutoNum type="arabicParenR"/>
+            </a:pPr>
+            <a:r>
+              <a:rPr lang="en-IE" sz="1200" dirty="0"/>
+              <a:t>Store the following as variables:</a:t>
+            </a:r>
+          </a:p>
+          <a:p>
+            <a:pPr marL="685800" lvl="1" indent="-228600">
+              <a:buAutoNum type="arabicParenR"/>
+            </a:pPr>
+            <a:r>
+              <a:rPr lang="en-IE" sz="1200" dirty="0"/>
+              <a:t>Component Ports</a:t>
+            </a:r>
+          </a:p>
+          <a:p>
+            <a:pPr marL="685800" lvl="1" indent="-228600">
+              <a:buAutoNum type="arabicParenR"/>
+            </a:pPr>
+            <a:r>
+              <a:rPr lang="en-IE" sz="1200" dirty="0"/>
+              <a:t>Internal Signals</a:t>
+            </a:r>
+          </a:p>
+          <a:p>
+            <a:pPr marL="685800" lvl="1" indent="-228600">
+              <a:buAutoNum type="arabicParenR"/>
+            </a:pPr>
+            <a:r>
+              <a:rPr lang="en-IE" sz="1200" dirty="0"/>
+              <a:t>HDL Language</a:t>
+            </a:r>
+          </a:p>
+          <a:p>
+            <a:pPr marL="685800" lvl="1" indent="-228600">
+              <a:buAutoNum type="arabicParenR"/>
+            </a:pPr>
+            <a:r>
+              <a:rPr lang="en-IE" sz="1200" dirty="0"/>
+              <a:t>Project Path</a:t>
+            </a:r>
+          </a:p>
+          <a:p>
+            <a:pPr marL="685800" lvl="1" indent="-228600">
+              <a:buAutoNum type="arabicParenR"/>
+            </a:pPr>
+            <a:r>
+              <a:rPr lang="en-IE" sz="1200" dirty="0"/>
+              <a:t>Vivado Path</a:t>
+            </a:r>
+          </a:p>
+          <a:p>
+            <a:pPr marL="228600" indent="-228600">
+              <a:buAutoNum type="arabicParenR"/>
+            </a:pPr>
+            <a:endParaRPr lang="en-IE" sz="1200" dirty="0"/>
+          </a:p>
+        </p:txBody>
+      </p:sp>
+      <p:sp>
+        <p:nvSpPr>
+          <p:cNvPr id="55" name="Rectangle: Rounded Corners 54">
+            <a:extLst>
+              <a:ext uri="{FF2B5EF4-FFF2-40B4-BE49-F238E27FC236}">
+                <a16:creationId xmlns:a16="http://schemas.microsoft.com/office/drawing/2014/main" id="{BA79DFF7-9B29-E007-1355-64F27FC88524}"/>
+              </a:ext>
+            </a:extLst>
+          </p:cNvPr>
+          <p:cNvSpPr/>
+          <p:nvPr/>
+        </p:nvSpPr>
+        <p:spPr>
+          <a:xfrm>
+            <a:off x="14368132" y="22832314"/>
+            <a:ext cx="2151393" cy="501554"/>
+          </a:xfrm>
+          <a:prstGeom prst="roundRect">
+            <a:avLst>
+              <a:gd name="adj" fmla="val 3503"/>
+            </a:avLst>
+          </a:prstGeom>
+        </p:spPr>
+        <p:style>
+          <a:lnRef idx="2">
+            <a:schemeClr val="accent3">
+              <a:shade val="15000"/>
+            </a:schemeClr>
+          </a:lnRef>
+          <a:fillRef idx="1">
+            <a:schemeClr val="accent3"/>
+          </a:fillRef>
+          <a:effectRef idx="0">
+            <a:schemeClr val="accent3"/>
+          </a:effectRef>
+          <a:fontRef idx="minor">
+            <a:schemeClr val="lt1"/>
+          </a:fontRef>
+        </p:style>
+        <p:txBody>
+          <a:bodyPr rtlCol="0" anchor="t"/>
+          <a:lstStyle/>
+          <a:p>
+            <a:r>
+              <a:rPr lang="en-IE" sz="1200" dirty="0"/>
+              <a:t>Step 2: Read Application Configuration</a:t>
+            </a:r>
+          </a:p>
+        </p:txBody>
+      </p:sp>
+      <p:sp>
+        <p:nvSpPr>
+          <p:cNvPr id="56" name="Rectangle: Rounded Corners 55">
+            <a:extLst>
+              <a:ext uri="{FF2B5EF4-FFF2-40B4-BE49-F238E27FC236}">
+                <a16:creationId xmlns:a16="http://schemas.microsoft.com/office/drawing/2014/main" id="{A5CB4384-142F-3851-8FEC-54594DA1CC6F}"/>
+              </a:ext>
+            </a:extLst>
+          </p:cNvPr>
+          <p:cNvSpPr/>
+          <p:nvPr/>
+        </p:nvSpPr>
+        <p:spPr>
+          <a:xfrm>
+            <a:off x="14368131" y="23333867"/>
+            <a:ext cx="2151393" cy="2297907"/>
+          </a:xfrm>
+          <a:prstGeom prst="roundRect">
+            <a:avLst>
+              <a:gd name="adj" fmla="val 3503"/>
+            </a:avLst>
+          </a:prstGeom>
+        </p:spPr>
+        <p:style>
+          <a:lnRef idx="2">
+            <a:schemeClr val="accent3">
+              <a:shade val="15000"/>
+            </a:schemeClr>
+          </a:lnRef>
+          <a:fillRef idx="1">
+            <a:schemeClr val="accent3"/>
+          </a:fillRef>
+          <a:effectRef idx="0">
+            <a:schemeClr val="accent3"/>
+          </a:effectRef>
+          <a:fontRef idx="minor">
+            <a:schemeClr val="lt1"/>
+          </a:fontRef>
+        </p:style>
+        <p:txBody>
+          <a:bodyPr rtlCol="0" anchor="t"/>
+          <a:lstStyle/>
+          <a:p>
+            <a:pPr marL="228600" indent="-228600">
+              <a:buAutoNum type="arabicParenR"/>
+            </a:pPr>
+            <a:r>
+              <a:rPr lang="en-IE" sz="1200" dirty="0"/>
+              <a:t>Store the following as variables:</a:t>
+            </a:r>
+          </a:p>
+          <a:p>
+            <a:pPr marL="685800" lvl="1" indent="-228600">
+              <a:buAutoNum type="arabicParenR"/>
+            </a:pPr>
+            <a:r>
+              <a:rPr lang="en-IE" sz="1200" dirty="0"/>
+              <a:t>Keep Vivado Open</a:t>
+            </a:r>
+          </a:p>
+          <a:p>
+            <a:pPr marL="685800" lvl="1" indent="-228600">
+              <a:buAutoNum type="arabicParenR"/>
+            </a:pPr>
+            <a:r>
+              <a:rPr lang="en-IE" sz="1200" dirty="0"/>
+              <a:t>Open Vivado GUI</a:t>
+            </a:r>
+          </a:p>
+          <a:p>
+            <a:pPr marL="685800" lvl="1" indent="-228600">
+              <a:buAutoNum type="arabicParenR"/>
+            </a:pPr>
+            <a:r>
+              <a:rPr lang="en-IE" sz="1200" dirty="0"/>
+              <a:t>Generate </a:t>
+            </a:r>
+            <a:r>
+              <a:rPr lang="en-IE" sz="1200" dirty="0" err="1"/>
+              <a:t>Jupyter</a:t>
+            </a:r>
+            <a:r>
+              <a:rPr lang="en-IE" sz="1200" dirty="0"/>
+              <a:t> Notebook File</a:t>
+            </a:r>
+          </a:p>
+          <a:p>
+            <a:pPr marL="685800" lvl="1" indent="-228600">
+              <a:buAutoNum type="arabicParenR"/>
+            </a:pPr>
+            <a:r>
+              <a:rPr lang="en-IE" sz="1200" dirty="0"/>
+              <a:t>Connect Signals to IO</a:t>
+            </a:r>
+          </a:p>
+          <a:p>
+            <a:pPr marL="685800" lvl="1" indent="-228600">
+              <a:buAutoNum type="arabicParenR"/>
+            </a:pPr>
+            <a:r>
+              <a:rPr lang="en-IE" sz="1200" dirty="0"/>
+              <a:t>Make internal signals as ports</a:t>
+            </a:r>
+          </a:p>
+          <a:p>
+            <a:pPr lvl="1"/>
+            <a:endParaRPr lang="en-IE" sz="1200" dirty="0"/>
+          </a:p>
+          <a:p>
+            <a:pPr marL="228600" indent="-228600">
+              <a:buAutoNum type="arabicParenR"/>
+            </a:pPr>
+            <a:endParaRPr lang="en-IE" sz="1200" dirty="0"/>
+          </a:p>
+        </p:txBody>
+      </p:sp>
+      <p:sp>
+        <p:nvSpPr>
+          <p:cNvPr id="57" name="Rectangle: Rounded Corners 56">
+            <a:extLst>
+              <a:ext uri="{FF2B5EF4-FFF2-40B4-BE49-F238E27FC236}">
+                <a16:creationId xmlns:a16="http://schemas.microsoft.com/office/drawing/2014/main" id="{F8FEFA8D-501D-D6C4-FDF2-71308A792B6F}"/>
+              </a:ext>
+            </a:extLst>
+          </p:cNvPr>
+          <p:cNvSpPr/>
+          <p:nvPr/>
+        </p:nvSpPr>
+        <p:spPr>
+          <a:xfrm>
+            <a:off x="17733631" y="22832314"/>
+            <a:ext cx="2151393" cy="501554"/>
+          </a:xfrm>
+          <a:prstGeom prst="roundRect">
+            <a:avLst>
+              <a:gd name="adj" fmla="val 3503"/>
+            </a:avLst>
+          </a:prstGeom>
+        </p:spPr>
+        <p:style>
+          <a:lnRef idx="2">
+            <a:schemeClr val="accent4">
+              <a:shade val="15000"/>
+            </a:schemeClr>
+          </a:lnRef>
+          <a:fillRef idx="1">
+            <a:schemeClr val="accent4"/>
+          </a:fillRef>
+          <a:effectRef idx="0">
+            <a:schemeClr val="accent4"/>
+          </a:effectRef>
+          <a:fontRef idx="minor">
+            <a:schemeClr val="lt1"/>
+          </a:fontRef>
+        </p:style>
+        <p:txBody>
+          <a:bodyPr rtlCol="0" anchor="t"/>
+          <a:lstStyle/>
+          <a:p>
+            <a:r>
+              <a:rPr lang="en-IE" sz="1200" dirty="0"/>
+              <a:t>Step 3: Vivado Preparation</a:t>
+            </a:r>
+          </a:p>
+        </p:txBody>
+      </p:sp>
+      <p:sp>
+        <p:nvSpPr>
+          <p:cNvPr id="63" name="Rectangle: Rounded Corners 62">
+            <a:extLst>
+              <a:ext uri="{FF2B5EF4-FFF2-40B4-BE49-F238E27FC236}">
+                <a16:creationId xmlns:a16="http://schemas.microsoft.com/office/drawing/2014/main" id="{9A69BDFE-A265-AA55-0709-3A7B340DEA1C}"/>
+              </a:ext>
+            </a:extLst>
+          </p:cNvPr>
+          <p:cNvSpPr/>
+          <p:nvPr/>
+        </p:nvSpPr>
+        <p:spPr>
+          <a:xfrm>
+            <a:off x="17733630" y="23333867"/>
+            <a:ext cx="2151393" cy="4834733"/>
+          </a:xfrm>
+          <a:prstGeom prst="roundRect">
+            <a:avLst>
+              <a:gd name="adj" fmla="val 3503"/>
+            </a:avLst>
+          </a:prstGeom>
+        </p:spPr>
+        <p:style>
+          <a:lnRef idx="2">
+            <a:schemeClr val="accent4">
+              <a:shade val="15000"/>
+            </a:schemeClr>
+          </a:lnRef>
+          <a:fillRef idx="1">
+            <a:schemeClr val="accent4"/>
+          </a:fillRef>
+          <a:effectRef idx="0">
+            <a:schemeClr val="accent4"/>
+          </a:effectRef>
+          <a:fontRef idx="minor">
+            <a:schemeClr val="lt1"/>
+          </a:fontRef>
+        </p:style>
+        <p:txBody>
+          <a:bodyPr rtlCol="0" anchor="t"/>
+          <a:lstStyle/>
+          <a:p>
+            <a:pPr marL="228600" indent="-228600">
+              <a:buAutoNum type="arabicParenR"/>
+            </a:pPr>
+            <a:r>
+              <a:rPr lang="en-IE" sz="1200" dirty="0"/>
+              <a:t>Contains all the build instructions required by Vivado to compile the project (instructions based on data gathered in stage 1 and 2)</a:t>
+            </a:r>
+          </a:p>
+          <a:p>
+            <a:pPr marL="685800" lvl="1" indent="-228600">
+              <a:buAutoNum type="arabicParenR"/>
+            </a:pPr>
+            <a:r>
+              <a:rPr lang="en-IE" sz="1200" dirty="0"/>
+              <a:t>Open Project</a:t>
+            </a:r>
+          </a:p>
+          <a:p>
+            <a:pPr marL="685800" lvl="1" indent="-228600">
+              <a:buAutoNum type="arabicParenR"/>
+            </a:pPr>
+            <a:r>
+              <a:rPr lang="en-IE" sz="1200" dirty="0"/>
+              <a:t>Create Block Diagram</a:t>
+            </a:r>
+          </a:p>
+          <a:p>
+            <a:pPr marL="685800" lvl="1" indent="-228600">
+              <a:buAutoNum type="arabicParenR"/>
+            </a:pPr>
+            <a:r>
+              <a:rPr lang="en-IE" sz="1200" dirty="0"/>
+              <a:t>Export</a:t>
+            </a:r>
+          </a:p>
+          <a:p>
+            <a:pPr marL="685800" lvl="1" indent="-228600">
+              <a:buAutoNum type="arabicParenR"/>
+            </a:pPr>
+            <a:r>
+              <a:rPr lang="en-IE" sz="1200" dirty="0"/>
+              <a:t>Synthesis/Implementation and Bitstream Generation</a:t>
+            </a:r>
+          </a:p>
+          <a:p>
+            <a:pPr marL="685800" lvl="1" indent="-228600">
+              <a:buAutoNum type="arabicParenR"/>
+            </a:pPr>
+            <a:r>
+              <a:rPr lang="en-IE" sz="1200" dirty="0"/>
+              <a:t>Etc using </a:t>
+            </a:r>
+            <a:r>
+              <a:rPr lang="en-IE" sz="1200" dirty="0" err="1"/>
+              <a:t>Tcl</a:t>
+            </a:r>
+            <a:r>
+              <a:rPr lang="en-IE" sz="1200" dirty="0"/>
+              <a:t> language</a:t>
+            </a:r>
+          </a:p>
+          <a:p>
+            <a:pPr marL="228600" indent="-228600">
+              <a:buAutoNum type="arabicParenR"/>
+            </a:pPr>
+            <a:r>
+              <a:rPr lang="en-IE" sz="1200" dirty="0"/>
+              <a:t>Create an XDC file (Master Constraints File) required to connect to board I/O on FPGA (if applicable)</a:t>
+            </a:r>
+          </a:p>
+          <a:p>
+            <a:pPr marL="228600" indent="-228600">
+              <a:buAutoNum type="arabicParenR"/>
+            </a:pPr>
+            <a:r>
+              <a:rPr lang="en-IE" sz="1200" dirty="0"/>
+              <a:t>Modify the source VHDL/Verilog File (to connect internal signals to ports) if specified</a:t>
+            </a:r>
+          </a:p>
+          <a:p>
+            <a:pPr marL="228600" indent="-228600">
+              <a:buAutoNum type="arabicParenR"/>
+            </a:pPr>
+            <a:endParaRPr lang="en-IE" sz="1200" dirty="0"/>
+          </a:p>
+          <a:p>
+            <a:pPr marL="685800" lvl="1" indent="-228600">
+              <a:buAutoNum type="arabicParenR"/>
+            </a:pPr>
+            <a:endParaRPr lang="en-IE" sz="1200" dirty="0"/>
+          </a:p>
+        </p:txBody>
+      </p:sp>
+      <p:sp>
+        <p:nvSpPr>
+          <p:cNvPr id="64" name="Rectangle: Rounded Corners 63">
+            <a:extLst>
+              <a:ext uri="{FF2B5EF4-FFF2-40B4-BE49-F238E27FC236}">
+                <a16:creationId xmlns:a16="http://schemas.microsoft.com/office/drawing/2014/main" id="{F688F692-023C-6FBD-A44D-61473FCA815E}"/>
+              </a:ext>
+            </a:extLst>
+          </p:cNvPr>
+          <p:cNvSpPr/>
+          <p:nvPr/>
+        </p:nvSpPr>
+        <p:spPr>
+          <a:xfrm>
+            <a:off x="21099129" y="22832314"/>
+            <a:ext cx="5126371" cy="501554"/>
+          </a:xfrm>
+          <a:prstGeom prst="roundRect">
+            <a:avLst>
+              <a:gd name="adj" fmla="val 18696"/>
+            </a:avLst>
+          </a:prstGeom>
+        </p:spPr>
+        <p:style>
+          <a:lnRef idx="2">
+            <a:schemeClr val="accent1">
+              <a:shade val="15000"/>
+            </a:schemeClr>
+          </a:lnRef>
+          <a:fillRef idx="1">
+            <a:schemeClr val="accent1"/>
+          </a:fillRef>
+          <a:effectRef idx="0">
+            <a:schemeClr val="accent1"/>
+          </a:effectRef>
+          <a:fontRef idx="minor">
+            <a:schemeClr val="lt1"/>
+          </a:fontRef>
+        </p:style>
+        <p:txBody>
+          <a:bodyPr rtlCol="0" anchor="t"/>
+          <a:lstStyle/>
+          <a:p>
+            <a:r>
+              <a:rPr lang="en-IE" sz="1200" dirty="0"/>
+              <a:t>Step 4: Execute </a:t>
+            </a:r>
+            <a:r>
+              <a:rPr lang="en-IE" sz="1200" dirty="0" err="1"/>
+              <a:t>Tcl</a:t>
+            </a:r>
+            <a:r>
+              <a:rPr lang="en-IE" sz="1200" dirty="0"/>
+              <a:t> in Vivado</a:t>
+            </a:r>
+          </a:p>
+        </p:txBody>
+      </p:sp>
+      <p:sp>
+        <p:nvSpPr>
+          <p:cNvPr id="65" name="Rectangle: Rounded Corners 64">
+            <a:extLst>
+              <a:ext uri="{FF2B5EF4-FFF2-40B4-BE49-F238E27FC236}">
+                <a16:creationId xmlns:a16="http://schemas.microsoft.com/office/drawing/2014/main" id="{F70D5A9F-A4ED-D1D2-D6E9-4EF52754EA04}"/>
+              </a:ext>
+            </a:extLst>
+          </p:cNvPr>
+          <p:cNvSpPr/>
+          <p:nvPr/>
+        </p:nvSpPr>
+        <p:spPr>
+          <a:xfrm>
+            <a:off x="21099128" y="23333867"/>
+            <a:ext cx="5126372" cy="4263233"/>
+          </a:xfrm>
+          <a:prstGeom prst="roundRect">
+            <a:avLst>
+              <a:gd name="adj" fmla="val 3503"/>
+            </a:avLst>
+          </a:prstGeom>
+        </p:spPr>
+        <p:style>
+          <a:lnRef idx="2">
+            <a:schemeClr val="accent1">
+              <a:shade val="15000"/>
+            </a:schemeClr>
+          </a:lnRef>
+          <a:fillRef idx="1">
+            <a:schemeClr val="accent1"/>
+          </a:fillRef>
+          <a:effectRef idx="0">
+            <a:schemeClr val="accent1"/>
+          </a:effectRef>
+          <a:fontRef idx="minor">
+            <a:schemeClr val="lt1"/>
+          </a:fontRef>
+        </p:style>
+        <p:txBody>
+          <a:bodyPr rtlCol="0" anchor="t"/>
+          <a:lstStyle/>
+          <a:p>
+            <a:pPr marL="228600" indent="-228600">
+              <a:buAutoNum type="arabicParenR"/>
+            </a:pPr>
+            <a:r>
+              <a:rPr lang="en-IE" sz="1200" dirty="0"/>
+              <a:t>SoC Builder will prompt Vivado to run the build steps (from </a:t>
+            </a:r>
+            <a:r>
+              <a:rPr lang="en-IE" sz="1200" dirty="0" err="1"/>
+              <a:t>Tcl</a:t>
+            </a:r>
+            <a:r>
+              <a:rPr lang="en-IE" sz="1200" dirty="0"/>
+              <a:t> file).</a:t>
+            </a:r>
+          </a:p>
+          <a:p>
+            <a:pPr marL="228600" indent="-228600">
+              <a:buAutoNum type="arabicParenR"/>
+            </a:pPr>
+            <a:r>
+              <a:rPr lang="en-IE" sz="1200" dirty="0"/>
+              <a:t>Build Steps:</a:t>
+            </a:r>
+          </a:p>
+          <a:p>
+            <a:pPr marL="685800" lvl="1" indent="-228600">
+              <a:buAutoNum type="arabicParenR"/>
+            </a:pPr>
+            <a:r>
+              <a:rPr lang="en-IE" sz="1200" dirty="0"/>
+              <a:t>Open Project</a:t>
+            </a:r>
+          </a:p>
+          <a:p>
+            <a:pPr marL="685800" lvl="1" indent="-228600">
+              <a:buAutoNum type="arabicParenR"/>
+            </a:pPr>
+            <a:r>
+              <a:rPr lang="en-IE" sz="1200" dirty="0"/>
+              <a:t>Import XDC Constraints File </a:t>
+            </a:r>
+          </a:p>
+          <a:p>
+            <a:pPr marL="1143000" lvl="2" indent="-228600">
+              <a:buAutoNum type="arabicParenR"/>
+            </a:pPr>
+            <a:r>
+              <a:rPr lang="en-IE" sz="1200" dirty="0"/>
+              <a:t>Delete existing if needed</a:t>
+            </a:r>
+          </a:p>
+          <a:p>
+            <a:pPr marL="685800" lvl="1" indent="-228600">
+              <a:buAutoNum type="arabicParenR"/>
+            </a:pPr>
+            <a:r>
+              <a:rPr lang="en-IE" sz="1200" dirty="0"/>
+              <a:t>Create Block Diagram File</a:t>
+            </a:r>
+          </a:p>
+          <a:p>
+            <a:pPr marL="1143000" lvl="2" indent="-228600">
+              <a:buAutoNum type="arabicParenR"/>
+            </a:pPr>
+            <a:r>
+              <a:rPr lang="en-IE" sz="1200" dirty="0"/>
+              <a:t>Import Component</a:t>
+            </a:r>
+          </a:p>
+          <a:p>
+            <a:pPr marL="1143000" lvl="2" indent="-228600">
+              <a:buAutoNum type="arabicParenR"/>
+            </a:pPr>
+            <a:r>
+              <a:rPr lang="en-IE" sz="1200" dirty="0"/>
+              <a:t>Export SVG of Block Diagram (Component Only)</a:t>
+            </a:r>
+          </a:p>
+          <a:p>
+            <a:pPr marL="1143000" lvl="2" indent="-228600">
+              <a:buAutoNum type="arabicParenR"/>
+            </a:pPr>
+            <a:r>
+              <a:rPr lang="en-IE" sz="1200" dirty="0"/>
+              <a:t>Import Processing Unit</a:t>
+            </a:r>
+          </a:p>
+          <a:p>
+            <a:pPr marL="1143000" lvl="2" indent="-228600">
+              <a:buAutoNum type="arabicParenR"/>
+            </a:pPr>
+            <a:r>
+              <a:rPr lang="en-IE" sz="1200" dirty="0"/>
+              <a:t>Import all the other required IP</a:t>
+            </a:r>
+          </a:p>
+          <a:p>
+            <a:pPr marL="1143000" lvl="2" indent="-228600">
+              <a:buAutoNum type="arabicParenR"/>
+            </a:pPr>
+            <a:r>
+              <a:rPr lang="en-IE" sz="1200" dirty="0"/>
+              <a:t>Connect IP</a:t>
+            </a:r>
+          </a:p>
+          <a:p>
+            <a:pPr marL="1143000" lvl="2" indent="-228600">
+              <a:buAutoNum type="arabicParenR"/>
+            </a:pPr>
+            <a:r>
+              <a:rPr lang="en-IE" sz="1200" dirty="0"/>
+              <a:t>Run Block and Connection Automation tools in Vivado</a:t>
+            </a:r>
+          </a:p>
+          <a:p>
+            <a:pPr marL="1143000" lvl="2" indent="-228600">
+              <a:buAutoNum type="arabicParenR"/>
+            </a:pPr>
+            <a:r>
+              <a:rPr lang="en-IE" sz="1200" dirty="0"/>
+              <a:t>Assign Memory Address Space</a:t>
+            </a:r>
+          </a:p>
+          <a:p>
+            <a:pPr marL="1143000" lvl="2" indent="-228600">
+              <a:buAutoNum type="arabicParenR"/>
+            </a:pPr>
+            <a:r>
+              <a:rPr lang="en-IE" sz="1200" dirty="0"/>
+              <a:t>Validate Block Design</a:t>
+            </a:r>
+          </a:p>
+          <a:p>
+            <a:pPr marL="685800" lvl="1" indent="-228600">
+              <a:buAutoNum type="arabicParenR"/>
+            </a:pPr>
+            <a:r>
+              <a:rPr lang="en-IE" sz="1200" dirty="0"/>
+              <a:t>Export Block Design</a:t>
+            </a:r>
+          </a:p>
+          <a:p>
+            <a:pPr marL="685800" lvl="1" indent="-228600">
+              <a:buAutoNum type="arabicParenR"/>
+            </a:pPr>
+            <a:r>
+              <a:rPr lang="en-IE" sz="1200" dirty="0"/>
+              <a:t>Run Synthesis</a:t>
+            </a:r>
+          </a:p>
+          <a:p>
+            <a:pPr marL="685800" lvl="1" indent="-228600">
+              <a:buAutoNum type="arabicParenR"/>
+            </a:pPr>
+            <a:r>
+              <a:rPr lang="en-IE" sz="1200" dirty="0"/>
+              <a:t>Run Implementation</a:t>
+            </a:r>
+          </a:p>
+          <a:p>
+            <a:pPr marL="685800" lvl="1" indent="-228600">
+              <a:buAutoNum type="arabicParenR"/>
+            </a:pPr>
+            <a:r>
+              <a:rPr lang="en-IE" sz="1200" dirty="0"/>
+              <a:t>Generate Bitstream</a:t>
+            </a:r>
+          </a:p>
+          <a:p>
+            <a:pPr marL="685800" lvl="1" indent="-228600">
+              <a:buAutoNum type="arabicParenR"/>
+            </a:pPr>
+            <a:r>
+              <a:rPr lang="en-IE" sz="1200" dirty="0"/>
+              <a:t>Close Project</a:t>
+            </a:r>
+          </a:p>
+          <a:p>
+            <a:pPr marL="228600" indent="-228600">
+              <a:buAutoNum type="arabicParenR"/>
+            </a:pPr>
+            <a:r>
+              <a:rPr lang="en-IE" sz="1200" dirty="0"/>
+              <a:t>Once Vivado closes, and no errors or problems have been detected, the SoC Builder will search  the project directory and retrieve the output binaries - .bit, .</a:t>
+            </a:r>
+            <a:r>
+              <a:rPr lang="en-IE" sz="1200" dirty="0" err="1"/>
+              <a:t>hwh</a:t>
+            </a:r>
+            <a:r>
+              <a:rPr lang="en-IE" sz="1200" dirty="0"/>
+              <a:t> and .</a:t>
+            </a:r>
+            <a:r>
+              <a:rPr lang="en-IE" sz="1200" dirty="0" err="1"/>
+              <a:t>tcl</a:t>
+            </a:r>
+            <a:r>
+              <a:rPr lang="en-IE" sz="1200" dirty="0"/>
+              <a:t> file.</a:t>
+            </a:r>
+          </a:p>
+          <a:p>
+            <a:pPr marL="228600" indent="-228600">
+              <a:buAutoNum type="arabicParenR"/>
+            </a:pPr>
+            <a:endParaRPr lang="en-IE" sz="1200" dirty="0"/>
+          </a:p>
+          <a:p>
+            <a:pPr marL="685800" lvl="1" indent="-228600">
+              <a:buAutoNum type="arabicParenR"/>
+            </a:pPr>
+            <a:endParaRPr lang="en-IE" sz="1200" dirty="0"/>
+          </a:p>
+        </p:txBody>
+      </p:sp>
+      <p:sp>
+        <p:nvSpPr>
+          <p:cNvPr id="66" name="Rectangle: Rounded Corners 65">
+            <a:extLst>
+              <a:ext uri="{FF2B5EF4-FFF2-40B4-BE49-F238E27FC236}">
+                <a16:creationId xmlns:a16="http://schemas.microsoft.com/office/drawing/2014/main" id="{515A0185-DE2C-CE77-6DFD-C43C80D13AA9}"/>
+              </a:ext>
+            </a:extLst>
+          </p:cNvPr>
+          <p:cNvSpPr/>
+          <p:nvPr/>
+        </p:nvSpPr>
+        <p:spPr>
+          <a:xfrm>
+            <a:off x="27439605" y="22832314"/>
+            <a:ext cx="2151393" cy="501554"/>
+          </a:xfrm>
+          <a:prstGeom prst="roundRect">
+            <a:avLst>
+              <a:gd name="adj" fmla="val 3503"/>
+            </a:avLst>
+          </a:prstGeom>
+        </p:spPr>
+        <p:style>
+          <a:lnRef idx="2">
+            <a:schemeClr val="accent2">
+              <a:shade val="15000"/>
+            </a:schemeClr>
+          </a:lnRef>
+          <a:fillRef idx="1">
+            <a:schemeClr val="accent2"/>
+          </a:fillRef>
+          <a:effectRef idx="0">
+            <a:schemeClr val="accent2"/>
+          </a:effectRef>
+          <a:fontRef idx="minor">
+            <a:schemeClr val="lt1"/>
+          </a:fontRef>
+        </p:style>
+        <p:txBody>
+          <a:bodyPr rtlCol="0" anchor="t"/>
+          <a:lstStyle/>
+          <a:p>
+            <a:r>
+              <a:rPr lang="en-IE" sz="1200" dirty="0"/>
+              <a:t>Step 5: Generate </a:t>
+            </a:r>
+            <a:r>
+              <a:rPr lang="en-IE" sz="1200" dirty="0" err="1"/>
+              <a:t>Jupyter</a:t>
+            </a:r>
+            <a:r>
+              <a:rPr lang="en-IE" sz="1200" dirty="0"/>
+              <a:t> Notebook</a:t>
+            </a:r>
+          </a:p>
+        </p:txBody>
+      </p:sp>
+      <p:sp>
+        <p:nvSpPr>
+          <p:cNvPr id="67" name="Rectangle: Rounded Corners 66">
+            <a:extLst>
+              <a:ext uri="{FF2B5EF4-FFF2-40B4-BE49-F238E27FC236}">
+                <a16:creationId xmlns:a16="http://schemas.microsoft.com/office/drawing/2014/main" id="{D52B917A-1BAA-27C4-91AC-ED5E84B98D8D}"/>
+              </a:ext>
+            </a:extLst>
+          </p:cNvPr>
+          <p:cNvSpPr/>
+          <p:nvPr/>
+        </p:nvSpPr>
+        <p:spPr>
+          <a:xfrm>
+            <a:off x="27439604" y="23333867"/>
+            <a:ext cx="2151393" cy="4834733"/>
+          </a:xfrm>
+          <a:prstGeom prst="roundRect">
+            <a:avLst>
+              <a:gd name="adj" fmla="val 3503"/>
+            </a:avLst>
+          </a:prstGeom>
+        </p:spPr>
+        <p:style>
+          <a:lnRef idx="2">
+            <a:schemeClr val="accent2">
+              <a:shade val="15000"/>
+            </a:schemeClr>
+          </a:lnRef>
+          <a:fillRef idx="1">
+            <a:schemeClr val="accent2"/>
+          </a:fillRef>
+          <a:effectRef idx="0">
+            <a:schemeClr val="accent2"/>
+          </a:effectRef>
+          <a:fontRef idx="minor">
+            <a:schemeClr val="lt1"/>
+          </a:fontRef>
+        </p:style>
+        <p:txBody>
+          <a:bodyPr rtlCol="0" anchor="t"/>
+          <a:lstStyle/>
+          <a:p>
+            <a:pPr marL="228600" indent="-228600">
+              <a:buAutoNum type="arabicParenR"/>
+            </a:pPr>
+            <a:r>
+              <a:rPr lang="en-IE" sz="1200" dirty="0"/>
+              <a:t>In this stage, two files are created, a  (</a:t>
+            </a:r>
+            <a:r>
+              <a:rPr lang="en-IE" sz="1200" dirty="0" err="1"/>
+              <a:t>ipynb</a:t>
+            </a:r>
+            <a:r>
+              <a:rPr lang="en-IE" sz="1200" dirty="0"/>
+              <a:t>) Notebook file and a supplementary Python file</a:t>
+            </a:r>
+          </a:p>
+          <a:p>
+            <a:pPr marL="228600" indent="-228600">
+              <a:buAutoNum type="arabicParenR"/>
+            </a:pPr>
+            <a:r>
+              <a:rPr lang="en-IE" sz="1200" dirty="0"/>
+              <a:t>Using information from Stage 1 and 2, the Overlay (bitstream file) is loaded, and signals are defined.</a:t>
+            </a:r>
+          </a:p>
+          <a:p>
+            <a:pPr marL="228600" indent="-228600">
+              <a:buAutoNum type="arabicParenR"/>
+            </a:pPr>
+            <a:r>
+              <a:rPr lang="en-IE" sz="1200" dirty="0"/>
+              <a:t>Code to make the GUI controller and LED GUI is added to the Python file.</a:t>
+            </a:r>
+          </a:p>
+          <a:p>
+            <a:pPr marL="228600" indent="-228600">
+              <a:buAutoNum type="arabicParenR"/>
+            </a:pPr>
+            <a:r>
+              <a:rPr lang="en-IE" sz="1200" dirty="0" err="1"/>
+              <a:t>Testplan</a:t>
+            </a:r>
+            <a:r>
+              <a:rPr lang="en-IE" sz="1200" dirty="0"/>
+              <a:t> from </a:t>
+            </a:r>
+            <a:r>
+              <a:rPr lang="en-IE" sz="1200" dirty="0" err="1"/>
+              <a:t>HDLGen</a:t>
+            </a:r>
+            <a:r>
+              <a:rPr lang="en-IE" sz="1200" dirty="0"/>
+              <a:t> XML is read. It is presented as markdown and each test in the </a:t>
+            </a:r>
+            <a:r>
+              <a:rPr lang="en-IE" sz="1200" dirty="0" err="1"/>
+              <a:t>testplan</a:t>
+            </a:r>
+            <a:r>
+              <a:rPr lang="en-IE" sz="1200" dirty="0"/>
+              <a:t> is generated in the </a:t>
+            </a:r>
+            <a:r>
+              <a:rPr lang="en-IE" sz="1200" dirty="0" err="1"/>
+              <a:t>Jupyter</a:t>
+            </a:r>
+            <a:r>
+              <a:rPr lang="en-IE" sz="1200" dirty="0"/>
+              <a:t> Notebook if specified.</a:t>
+            </a:r>
+          </a:p>
+          <a:p>
+            <a:pPr marL="228600" indent="-228600">
+              <a:buAutoNum type="arabicParenR"/>
+            </a:pPr>
+            <a:endParaRPr lang="en-IE" sz="1200" dirty="0"/>
+          </a:p>
+        </p:txBody>
+      </p:sp>
+    </p:spTree>
+    <p:extLst>
+      <p:ext uri="{BB962C8B-B14F-4D97-AF65-F5344CB8AC3E}">
+        <p14:creationId xmlns:p14="http://schemas.microsoft.com/office/powerpoint/2010/main" val="2761365222"/>
+      </p:ext>
+    </p:extLst>
+  </p:cSld>
+  <p:clrMapOvr>
+    <a:masterClrMapping/>
+  </p:clrMapOvr>
+</p:sld>
+</file>
+
+<file path=ppt/slides/slide5.xml><?xml version="1.0" encoding="utf-8"?>
+<p:sld xmlns:a="http://schemas.openxmlformats.org/drawingml/2006/main" xmlns:r="http://schemas.openxmlformats.org/officeDocument/2006/relationships" xmlns:p="http://schemas.openxmlformats.org/presentationml/2006/main">
+  <p:cSld>
+    <p:spTree>
+      <p:nvGrpSpPr>
+        <p:cNvPr id="1" name=""/>
+        <p:cNvGrpSpPr/>
+        <p:nvPr/>
+      </p:nvGrpSpPr>
+      <p:grpSpPr>
+        <a:xfrm>
+          <a:off x="0" y="0"/>
+          <a:ext cx="0" cy="0"/>
+          <a:chOff x="0" y="0"/>
+          <a:chExt cx="0" cy="0"/>
+        </a:xfrm>
+      </p:grpSpPr>
+      <p:sp>
+        <p:nvSpPr>
+          <p:cNvPr id="2" name="Title 1">
+            <a:extLst>
+              <a:ext uri="{FF2B5EF4-FFF2-40B4-BE49-F238E27FC236}">
+                <a16:creationId xmlns:a16="http://schemas.microsoft.com/office/drawing/2014/main" id="{9BF31D50-D8C7-984A-E77B-77840B7140C7}"/>
+              </a:ext>
+            </a:extLst>
+          </p:cNvPr>
+          <p:cNvSpPr>
+            <a:spLocks noGrp="1"/>
+          </p:cNvSpPr>
+          <p:nvPr>
+            <p:ph type="title"/>
+          </p:nvPr>
+        </p:nvSpPr>
+        <p:spPr/>
+        <p:txBody>
+          <a:bodyPr/>
+          <a:lstStyle/>
+          <a:p>
+            <a:endParaRPr lang="en-IE"/>
+          </a:p>
+        </p:txBody>
+      </p:sp>
+      <p:sp>
+        <p:nvSpPr>
+          <p:cNvPr id="3" name="Content Placeholder 2">
+            <a:extLst>
+              <a:ext uri="{FF2B5EF4-FFF2-40B4-BE49-F238E27FC236}">
+                <a16:creationId xmlns:a16="http://schemas.microsoft.com/office/drawing/2014/main" id="{81C42DB2-68A0-3EF1-2304-D0CBE728FB8E}"/>
+              </a:ext>
+            </a:extLst>
+          </p:cNvPr>
+          <p:cNvSpPr>
+            <a:spLocks noGrp="1"/>
+          </p:cNvSpPr>
+          <p:nvPr>
+            <p:ph idx="1"/>
+          </p:nvPr>
+        </p:nvSpPr>
+        <p:spPr/>
+        <p:txBody>
+          <a:bodyPr/>
+          <a:lstStyle/>
+          <a:p>
+            <a:endParaRPr lang="en-IE"/>
+          </a:p>
+        </p:txBody>
+      </p:sp>
+    </p:spTree>
+    <p:extLst>
+      <p:ext uri="{BB962C8B-B14F-4D97-AF65-F5344CB8AC3E}">
+        <p14:creationId xmlns:p14="http://schemas.microsoft.com/office/powerpoint/2010/main" val="1699782230"/>
       </p:ext>
     </p:extLst>
   </p:cSld>

</xml_diff>